<commit_message>
doc: fixed tech pictures to README
</commit_message>
<xml_diff>
--- a/README-tech.pptx
+++ b/README-tech.pptx
@@ -3356,7 +3356,7 @@
         </p:blipFill>
         <p:spPr bwMode="auto">
           <a:xfrm>
-            <a:off x="6500826" y="4797152"/>
+            <a:off x="6084168" y="4797152"/>
             <a:ext cx="720000" cy="649675"/>
           </a:xfrm>
           <a:prstGeom prst="rect">
@@ -3380,8 +3380,8 @@
         </p:nvSpPr>
         <p:spPr>
           <a:xfrm>
-            <a:off x="5786446" y="2857496"/>
-            <a:ext cx="2071702" cy="1357322"/>
+            <a:off x="5102276" y="2857496"/>
+            <a:ext cx="2782092" cy="1357322"/>
           </a:xfrm>
           <a:prstGeom prst="roundRect">
             <a:avLst/>
@@ -3426,8 +3426,8 @@
         </p:nvSpPr>
         <p:spPr>
           <a:xfrm>
-            <a:off x="5786446" y="1285860"/>
-            <a:ext cx="2071702" cy="1214446"/>
+            <a:off x="5102276" y="1285860"/>
+            <a:ext cx="2782092" cy="1214446"/>
           </a:xfrm>
           <a:prstGeom prst="roundRect">
             <a:avLst/>
@@ -3472,8 +3472,8 @@
         </p:nvSpPr>
         <p:spPr>
           <a:xfrm>
-            <a:off x="5857884" y="4500570"/>
-            <a:ext cx="1928826" cy="1000132"/>
+            <a:off x="5148064" y="4500570"/>
+            <a:ext cx="2664866" cy="1000132"/>
           </a:xfrm>
           <a:prstGeom prst="flowChartMagneticDisk">
             <a:avLst/>
@@ -3565,7 +3565,7 @@
         <p:spPr>
           <a:xfrm>
             <a:off x="428596" y="1285860"/>
-            <a:ext cx="5286412" cy="1285884"/>
+            <a:ext cx="4638707" cy="1285884"/>
           </a:xfrm>
           <a:prstGeom prst="rightArrow">
             <a:avLst>
@@ -3616,7 +3616,7 @@
         <p:spPr>
           <a:xfrm>
             <a:off x="500034" y="2928934"/>
-            <a:ext cx="5214974" cy="1214446"/>
+            <a:ext cx="4576022" cy="1214446"/>
           </a:xfrm>
           <a:prstGeom prst="rightArrow">
             <a:avLst>
@@ -3666,8 +3666,8 @@
         </p:nvSpPr>
         <p:spPr>
           <a:xfrm>
-            <a:off x="500034" y="4500570"/>
-            <a:ext cx="5286412" cy="1071570"/>
+            <a:off x="500035" y="4437112"/>
+            <a:ext cx="4576022" cy="1071570"/>
           </a:xfrm>
           <a:prstGeom prst="rightArrow">
             <a:avLst>
@@ -3734,7 +3734,7 @@
         </p:blipFill>
         <p:spPr bwMode="auto">
           <a:xfrm>
-            <a:off x="6572264" y="6006119"/>
+            <a:off x="6084168" y="5949280"/>
             <a:ext cx="720000" cy="637591"/>
           </a:xfrm>
           <a:prstGeom prst="rect">
@@ -3767,7 +3767,7 @@
         </p:blipFill>
         <p:spPr bwMode="auto">
           <a:xfrm>
-            <a:off x="3564658" y="1638744"/>
+            <a:off x="3059712" y="1638744"/>
             <a:ext cx="720000" cy="647248"/>
           </a:xfrm>
           <a:prstGeom prst="rect">
@@ -3783,39 +3783,6 @@
           <a:effectLst/>
         </p:spPr>
       </p:pic>
-      <p:pic>
-        <p:nvPicPr>
-          <p:cNvPr id="1043" name="Picture 19"/>
-          <p:cNvPicPr>
-            <a:picLocks noChangeAspect="1" noChangeArrowheads="1"/>
-          </p:cNvPicPr>
-          <p:nvPr/>
-        </p:nvPicPr>
-        <p:blipFill>
-          <a:blip r:embed="rId5" cstate="print"/>
-          <a:srcRect/>
-          <a:stretch>
-            <a:fillRect/>
-          </a:stretch>
-        </p:blipFill>
-        <p:spPr bwMode="auto">
-          <a:xfrm>
-            <a:off x="2708421" y="1574150"/>
-            <a:ext cx="711451" cy="702722"/>
-          </a:xfrm>
-          <a:prstGeom prst="rect">
-            <a:avLst/>
-          </a:prstGeom>
-          <a:noFill/>
-          <a:ln w="9525">
-            <a:noFill/>
-            <a:miter lim="800000"/>
-            <a:headEnd/>
-            <a:tailEnd/>
-          </a:ln>
-          <a:effectLst/>
-        </p:spPr>
-      </p:pic>
       <p:cxnSp>
         <p:nvCxnSpPr>
           <p:cNvPr id="30" name="Connecteur droit avec flèche 29"/>
@@ -3826,9 +3793,9 @@
           <p:nvPr/>
         </p:nvCxnSpPr>
         <p:spPr>
-          <a:xfrm rot="5400000">
-            <a:off x="6679421" y="4357694"/>
-            <a:ext cx="285752" cy="1588"/>
+          <a:xfrm flipH="1">
+            <a:off x="6480497" y="4214818"/>
+            <a:ext cx="12825" cy="285752"/>
           </a:xfrm>
           <a:prstGeom prst="straightConnector1">
             <a:avLst/>
@@ -3868,9 +3835,9 @@
           <p:nvPr/>
         </p:nvCxnSpPr>
         <p:spPr>
-          <a:xfrm rot="5400000">
-            <a:off x="6643702" y="2678901"/>
-            <a:ext cx="357190" cy="1588"/>
+          <a:xfrm>
+            <a:off x="6493322" y="2500306"/>
+            <a:ext cx="0" cy="357190"/>
           </a:xfrm>
           <a:prstGeom prst="straightConnector1">
             <a:avLst/>
@@ -3909,6 +3876,47 @@
           <p:nvPr/>
         </p:nvPicPr>
         <p:blipFill>
+          <a:blip r:embed="rId5" cstate="print">
+            <a:duotone>
+              <a:schemeClr val="bg2">
+                <a:shade val="45000"/>
+                <a:satMod val="135000"/>
+              </a:schemeClr>
+              <a:prstClr val="white"/>
+            </a:duotone>
+          </a:blip>
+          <a:srcRect/>
+          <a:stretch>
+            <a:fillRect/>
+          </a:stretch>
+        </p:blipFill>
+        <p:spPr bwMode="auto">
+          <a:xfrm>
+            <a:off x="639783" y="6000768"/>
+            <a:ext cx="907881" cy="580295"/>
+          </a:xfrm>
+          <a:prstGeom prst="rect">
+            <a:avLst/>
+          </a:prstGeom>
+          <a:noFill/>
+          <a:ln w="9525">
+            <a:noFill/>
+            <a:miter lim="800000"/>
+            <a:headEnd/>
+            <a:tailEnd/>
+          </a:ln>
+          <a:effectLst/>
+        </p:spPr>
+      </p:pic>
+      <p:pic>
+        <p:nvPicPr>
+          <p:cNvPr id="1047" name="Picture 23"/>
+          <p:cNvPicPr>
+            <a:picLocks noChangeAspect="1" noChangeArrowheads="1"/>
+          </p:cNvPicPr>
+          <p:nvPr/>
+        </p:nvPicPr>
+        <p:blipFill>
           <a:blip r:embed="rId6" cstate="print">
             <a:duotone>
               <a:schemeClr val="bg2">
@@ -3925,8 +3933,8 @@
         </p:blipFill>
         <p:spPr bwMode="auto">
           <a:xfrm>
-            <a:off x="639783" y="6000768"/>
-            <a:ext cx="907881" cy="580295"/>
+            <a:off x="2987824" y="6011841"/>
+            <a:ext cx="1370511" cy="569222"/>
           </a:xfrm>
           <a:prstGeom prst="rect">
             <a:avLst/>
@@ -3943,22 +3951,14 @@
       </p:pic>
       <p:pic>
         <p:nvPicPr>
-          <p:cNvPr id="1047" name="Picture 23"/>
+          <p:cNvPr id="1050" name="Picture 26"/>
           <p:cNvPicPr>
             <a:picLocks noChangeAspect="1" noChangeArrowheads="1"/>
           </p:cNvPicPr>
           <p:nvPr/>
         </p:nvPicPr>
         <p:blipFill>
-          <a:blip r:embed="rId7" cstate="print">
-            <a:duotone>
-              <a:schemeClr val="bg2">
-                <a:shade val="45000"/>
-                <a:satMod val="135000"/>
-              </a:schemeClr>
-              <a:prstClr val="white"/>
-            </a:duotone>
-          </a:blip>
+          <a:blip r:embed="rId7" cstate="print"/>
           <a:srcRect/>
           <a:stretch>
             <a:fillRect/>
@@ -3966,8 +3966,8 @@
         </p:blipFill>
         <p:spPr bwMode="auto">
           <a:xfrm>
-            <a:off x="3286116" y="6011841"/>
-            <a:ext cx="1370511" cy="569222"/>
+            <a:off x="642910" y="4705466"/>
+            <a:ext cx="1428760" cy="620201"/>
           </a:xfrm>
           <a:prstGeom prst="rect">
             <a:avLst/>
@@ -3982,9 +3982,132 @@
           <a:effectLst/>
         </p:spPr>
       </p:pic>
+      <p:sp>
+        <p:nvSpPr>
+          <p:cNvPr id="48" name="Rectangle 47"/>
+          <p:cNvSpPr/>
+          <p:nvPr/>
+        </p:nvSpPr>
+        <p:spPr>
+          <a:xfrm>
+            <a:off x="2843808" y="428604"/>
+            <a:ext cx="1223412" cy="584775"/>
+          </a:xfrm>
+          <a:prstGeom prst="rect">
+            <a:avLst/>
+          </a:prstGeom>
+        </p:spPr>
+        <p:txBody>
+          <a:bodyPr wrap="none">
+            <a:spAutoFit/>
+          </a:bodyPr>
+          <a:lstStyle/>
+          <a:p>
+            <a:r>
+              <a:rPr lang="fr-FR" sz="3200" b="1" dirty="0" smtClean="0">
+                <a:solidFill>
+                  <a:schemeClr val="bg1">
+                    <a:lumMod val="75000"/>
+                  </a:schemeClr>
+                </a:solidFill>
+              </a:rPr>
+              <a:t>BUILD</a:t>
+            </a:r>
+            <a:endParaRPr lang="fr-FR" sz="3200" b="1" dirty="0">
+              <a:solidFill>
+                <a:schemeClr val="bg1">
+                  <a:lumMod val="75000"/>
+                </a:schemeClr>
+              </a:solidFill>
+            </a:endParaRPr>
+          </a:p>
+        </p:txBody>
+      </p:sp>
+      <p:sp>
+        <p:nvSpPr>
+          <p:cNvPr id="49" name="Rectangle 48"/>
+          <p:cNvSpPr/>
+          <p:nvPr/>
+        </p:nvSpPr>
+        <p:spPr>
+          <a:xfrm>
+            <a:off x="5940152" y="428604"/>
+            <a:ext cx="1233030" cy="584775"/>
+          </a:xfrm>
+          <a:prstGeom prst="rect">
+            <a:avLst/>
+          </a:prstGeom>
+        </p:spPr>
+        <p:txBody>
+          <a:bodyPr wrap="none">
+            <a:spAutoFit/>
+          </a:bodyPr>
+          <a:lstStyle/>
+          <a:p>
+            <a:r>
+              <a:rPr lang="fr-FR" sz="3200" b="1" dirty="0" smtClean="0">
+                <a:solidFill>
+                  <a:schemeClr val="bg1">
+                    <a:lumMod val="75000"/>
+                  </a:schemeClr>
+                </a:solidFill>
+              </a:rPr>
+              <a:t>INFRA</a:t>
+            </a:r>
+            <a:endParaRPr lang="fr-FR" sz="3200" b="1" dirty="0">
+              <a:solidFill>
+                <a:schemeClr val="bg1">
+                  <a:lumMod val="75000"/>
+                </a:schemeClr>
+              </a:solidFill>
+            </a:endParaRPr>
+          </a:p>
+        </p:txBody>
+      </p:sp>
+      <p:sp>
+        <p:nvSpPr>
+          <p:cNvPr id="50" name="Rectangle 49"/>
+          <p:cNvSpPr/>
+          <p:nvPr/>
+        </p:nvSpPr>
+        <p:spPr>
+          <a:xfrm>
+            <a:off x="617497" y="428604"/>
+            <a:ext cx="1135439" cy="584775"/>
+          </a:xfrm>
+          <a:prstGeom prst="rect">
+            <a:avLst/>
+          </a:prstGeom>
+        </p:spPr>
+        <p:txBody>
+          <a:bodyPr wrap="none">
+            <a:spAutoFit/>
+          </a:bodyPr>
+          <a:lstStyle/>
+          <a:p>
+            <a:r>
+              <a:rPr lang="fr-FR" sz="3200" b="1" dirty="0" smtClean="0">
+                <a:solidFill>
+                  <a:schemeClr val="bg1">
+                    <a:lumMod val="75000"/>
+                  </a:schemeClr>
+                </a:solidFill>
+              </a:rPr>
+              <a:t>CODE</a:t>
+            </a:r>
+            <a:endParaRPr lang="fr-FR" sz="3200" b="1" dirty="0">
+              <a:solidFill>
+                <a:schemeClr val="bg1">
+                  <a:lumMod val="75000"/>
+                </a:schemeClr>
+              </a:solidFill>
+            </a:endParaRPr>
+          </a:p>
+        </p:txBody>
+      </p:sp>
       <p:pic>
         <p:nvPicPr>
-          <p:cNvPr id="1050" name="Picture 26"/>
+          <p:cNvPr id="1026" name="Picture 2"/>
           <p:cNvPicPr>
             <a:picLocks noChangeAspect="1" noChangeArrowheads="1"/>
           </p:cNvPicPr>
@@ -3999,8 +4122,8 @@
         </p:blipFill>
         <p:spPr bwMode="auto">
           <a:xfrm>
-            <a:off x="642910" y="4705466"/>
-            <a:ext cx="1428760" cy="620201"/>
+            <a:off x="8178106" y="3068960"/>
+            <a:ext cx="714374" cy="800965"/>
           </a:xfrm>
           <a:prstGeom prst="rect">
             <a:avLst/>
@@ -4015,132 +4138,9 @@
           <a:effectLst/>
         </p:spPr>
       </p:pic>
-      <p:sp>
-        <p:nvSpPr>
-          <p:cNvPr id="48" name="Rectangle 47"/>
-          <p:cNvSpPr/>
-          <p:nvPr/>
-        </p:nvSpPr>
-        <p:spPr>
-          <a:xfrm>
-            <a:off x="3428992" y="428604"/>
-            <a:ext cx="1223412" cy="584775"/>
-          </a:xfrm>
-          <a:prstGeom prst="rect">
-            <a:avLst/>
-          </a:prstGeom>
-        </p:spPr>
-        <p:txBody>
-          <a:bodyPr wrap="none">
-            <a:spAutoFit/>
-          </a:bodyPr>
-          <a:lstStyle/>
-          <a:p>
-            <a:r>
-              <a:rPr lang="fr-FR" sz="3200" b="1" dirty="0" smtClean="0">
-                <a:solidFill>
-                  <a:schemeClr val="bg1">
-                    <a:lumMod val="75000"/>
-                  </a:schemeClr>
-                </a:solidFill>
-              </a:rPr>
-              <a:t>BUILD</a:t>
-            </a:r>
-            <a:endParaRPr lang="fr-FR" sz="3200" b="1" dirty="0">
-              <a:solidFill>
-                <a:schemeClr val="bg1">
-                  <a:lumMod val="75000"/>
-                </a:schemeClr>
-              </a:solidFill>
-            </a:endParaRPr>
-          </a:p>
-        </p:txBody>
-      </p:sp>
-      <p:sp>
-        <p:nvSpPr>
-          <p:cNvPr id="49" name="Rectangle 48"/>
-          <p:cNvSpPr/>
-          <p:nvPr/>
-        </p:nvSpPr>
-        <p:spPr>
-          <a:xfrm>
-            <a:off x="6357950" y="428604"/>
-            <a:ext cx="954107" cy="584775"/>
-          </a:xfrm>
-          <a:prstGeom prst="rect">
-            <a:avLst/>
-          </a:prstGeom>
-        </p:spPr>
-        <p:txBody>
-          <a:bodyPr wrap="none">
-            <a:spAutoFit/>
-          </a:bodyPr>
-          <a:lstStyle/>
-          <a:p>
-            <a:r>
-              <a:rPr lang="fr-FR" sz="3200" b="1" dirty="0" smtClean="0">
-                <a:solidFill>
-                  <a:schemeClr val="bg1">
-                    <a:lumMod val="75000"/>
-                  </a:schemeClr>
-                </a:solidFill>
-              </a:rPr>
-              <a:t>RUN</a:t>
-            </a:r>
-            <a:endParaRPr lang="fr-FR" sz="3200" b="1" dirty="0">
-              <a:solidFill>
-                <a:schemeClr val="bg1">
-                  <a:lumMod val="75000"/>
-                </a:schemeClr>
-              </a:solidFill>
-            </a:endParaRPr>
-          </a:p>
-        </p:txBody>
-      </p:sp>
-      <p:sp>
-        <p:nvSpPr>
-          <p:cNvPr id="50" name="Rectangle 49"/>
-          <p:cNvSpPr/>
-          <p:nvPr/>
-        </p:nvSpPr>
-        <p:spPr>
-          <a:xfrm>
-            <a:off x="617497" y="428604"/>
-            <a:ext cx="1135439" cy="584775"/>
-          </a:xfrm>
-          <a:prstGeom prst="rect">
-            <a:avLst/>
-          </a:prstGeom>
-        </p:spPr>
-        <p:txBody>
-          <a:bodyPr wrap="none">
-            <a:spAutoFit/>
-          </a:bodyPr>
-          <a:lstStyle/>
-          <a:p>
-            <a:r>
-              <a:rPr lang="fr-FR" sz="3200" b="1" dirty="0" smtClean="0">
-                <a:solidFill>
-                  <a:schemeClr val="bg1">
-                    <a:lumMod val="75000"/>
-                  </a:schemeClr>
-                </a:solidFill>
-              </a:rPr>
-              <a:t>CODE</a:t>
-            </a:r>
-            <a:endParaRPr lang="fr-FR" sz="3200" b="1" dirty="0">
-              <a:solidFill>
-                <a:schemeClr val="bg1">
-                  <a:lumMod val="75000"/>
-                </a:schemeClr>
-              </a:solidFill>
-            </a:endParaRPr>
-          </a:p>
-        </p:txBody>
-      </p:sp>
       <p:pic>
         <p:nvPicPr>
-          <p:cNvPr id="1026" name="Picture 2"/>
+          <p:cNvPr id="1027" name="Picture 3"/>
           <p:cNvPicPr>
             <a:picLocks noChangeAspect="1" noChangeArrowheads="1"/>
           </p:cNvPicPr>
@@ -4155,8 +4155,8 @@
         </p:blipFill>
         <p:spPr bwMode="auto">
           <a:xfrm>
-            <a:off x="8178106" y="3068960"/>
-            <a:ext cx="714374" cy="800965"/>
+            <a:off x="8046345" y="1571613"/>
+            <a:ext cx="954811" cy="785818"/>
           </a:xfrm>
           <a:prstGeom prst="rect">
             <a:avLst/>
@@ -4173,7 +4173,7 @@
       </p:pic>
       <p:pic>
         <p:nvPicPr>
-          <p:cNvPr id="1027" name="Picture 3"/>
+          <p:cNvPr id="1028" name="Picture 4"/>
           <p:cNvPicPr>
             <a:picLocks noChangeAspect="1" noChangeArrowheads="1"/>
           </p:cNvPicPr>
@@ -4188,8 +4188,8 @@
         </p:blipFill>
         <p:spPr bwMode="auto">
           <a:xfrm>
-            <a:off x="8046345" y="1571613"/>
-            <a:ext cx="954811" cy="785818"/>
+            <a:off x="5292080" y="3068960"/>
+            <a:ext cx="402492" cy="428628"/>
           </a:xfrm>
           <a:prstGeom prst="rect">
             <a:avLst/>
@@ -4206,7 +4206,7 @@
       </p:pic>
       <p:pic>
         <p:nvPicPr>
-          <p:cNvPr id="1028" name="Picture 4"/>
+          <p:cNvPr id="36" name="Picture 3" descr="C:\Users\damien\Downloads\expressjslogo.png"/>
           <p:cNvPicPr>
             <a:picLocks noChangeAspect="1" noChangeArrowheads="1"/>
           </p:cNvPicPr>
@@ -4221,25 +4221,18 @@
         </p:blipFill>
         <p:spPr bwMode="auto">
           <a:xfrm>
-            <a:off x="7286644" y="3714752"/>
-            <a:ext cx="402492" cy="428628"/>
+            <a:off x="5220072" y="3645024"/>
+            <a:ext cx="504056" cy="504056"/>
           </a:xfrm>
           <a:prstGeom prst="rect">
             <a:avLst/>
           </a:prstGeom>
           <a:noFill/>
-          <a:ln w="9525">
-            <a:noFill/>
-            <a:miter lim="800000"/>
-            <a:headEnd/>
-            <a:tailEnd/>
-          </a:ln>
-          <a:effectLst/>
         </p:spPr>
       </p:pic>
       <p:pic>
         <p:nvPicPr>
-          <p:cNvPr id="36" name="Picture 3" descr="C:\Users\damien\Downloads\expressjslogo.png"/>
+          <p:cNvPr id="39" name="Picture 7" descr="C:\Users\damien\Pictures\My Screen Shots\Screen Shot 09-09-18 at 05.08 PM.JPG"/>
           <p:cNvPicPr>
             <a:picLocks noChangeAspect="1" noChangeArrowheads="1"/>
           </p:cNvPicPr>
@@ -4254,8 +4247,8 @@
         </p:blipFill>
         <p:spPr bwMode="auto">
           <a:xfrm>
-            <a:off x="6588224" y="2996952"/>
-            <a:ext cx="504056" cy="504056"/>
+            <a:off x="5220072" y="1844824"/>
+            <a:ext cx="662143" cy="576064"/>
           </a:xfrm>
           <a:prstGeom prst="rect">
             <a:avLst/>
@@ -4265,7 +4258,7 @@
       </p:pic>
       <p:pic>
         <p:nvPicPr>
-          <p:cNvPr id="39" name="Picture 7" descr="C:\Users\damien\Pictures\My Screen Shots\Screen Shot 09-09-18 at 05.08 PM.JPG"/>
+          <p:cNvPr id="40" name="Picture 2" descr="C:\Users\damien\Downloads\584830f5cef1014c0b5e4aa1 (1).png"/>
           <p:cNvPicPr>
             <a:picLocks noChangeAspect="1" noChangeArrowheads="1"/>
           </p:cNvPicPr>
@@ -4280,8 +4273,8 @@
         </p:blipFill>
         <p:spPr bwMode="auto">
           <a:xfrm>
-            <a:off x="6948264" y="1340768"/>
-            <a:ext cx="831697" cy="723576"/>
+            <a:off x="5907644" y="1412776"/>
+            <a:ext cx="1184636" cy="1064095"/>
           </a:xfrm>
           <a:prstGeom prst="rect">
             <a:avLst/>
@@ -4291,7 +4284,7 @@
       </p:pic>
       <p:pic>
         <p:nvPicPr>
-          <p:cNvPr id="40" name="Picture 2" descr="C:\Users\damien\Downloads\584830f5cef1014c0b5e4aa1 (1).png"/>
+          <p:cNvPr id="41" name="Picture 6" descr="C:\Users\damien\Downloads\687474703a2f2f646f63732e73657175656c697a656a732e636f6d2f6d616e75616c2f61737365742f6c6f676f2d736d616c6c2e706e67.png"/>
           <p:cNvPicPr>
             <a:picLocks noChangeAspect="1" noChangeArrowheads="1"/>
           </p:cNvPicPr>
@@ -4306,8 +4299,8 @@
         </p:blipFill>
         <p:spPr bwMode="auto">
           <a:xfrm>
-            <a:off x="5868264" y="1356793"/>
-            <a:ext cx="863976" cy="776063"/>
+            <a:off x="7164288" y="3573016"/>
+            <a:ext cx="648072" cy="648072"/>
           </a:xfrm>
           <a:prstGeom prst="rect">
             <a:avLst/>
@@ -4317,7 +4310,7 @@
       </p:pic>
       <p:pic>
         <p:nvPicPr>
-          <p:cNvPr id="41" name="Picture 6" descr="C:\Users\damien\Downloads\687474703a2f2f646f63732e73657175656c697a656a732e636f6d2f6d616e75616c2f61737365742f6c6f676f2d736d616c6c2e706e67.png"/>
+          <p:cNvPr id="2051" name="Picture 3" descr="C:\Users\damien\Downloads\apple-touch-icon-180x180.png"/>
           <p:cNvPicPr>
             <a:picLocks noChangeAspect="1" noChangeArrowheads="1"/>
           </p:cNvPicPr>
@@ -4332,7 +4325,7 @@
         </p:blipFill>
         <p:spPr bwMode="auto">
           <a:xfrm>
-            <a:off x="6516216" y="3573016"/>
+            <a:off x="755576" y="3212976"/>
             <a:ext cx="648072" cy="648072"/>
           </a:xfrm>
           <a:prstGeom prst="rect">
@@ -4343,33 +4336,7 @@
       </p:pic>
       <p:pic>
         <p:nvPicPr>
-          <p:cNvPr id="42" name="Picture 2" descr="C:\Users\damien\Downloads\584830f5cef1014c0b5e4aa1 (1).png"/>
-          <p:cNvPicPr>
-            <a:picLocks noChangeAspect="1" noChangeArrowheads="1"/>
-          </p:cNvPicPr>
-          <p:nvPr/>
-        </p:nvPicPr>
-        <p:blipFill>
-          <a:blip r:embed="rId14" cstate="print"/>
-          <a:srcRect/>
-          <a:stretch>
-            <a:fillRect/>
-          </a:stretch>
-        </p:blipFill>
-        <p:spPr bwMode="auto">
-          <a:xfrm>
-            <a:off x="4140072" y="1556792"/>
-            <a:ext cx="863976" cy="776063"/>
-          </a:xfrm>
-          <a:prstGeom prst="rect">
-            <a:avLst/>
-          </a:prstGeom>
-          <a:noFill/>
-        </p:spPr>
-      </p:pic>
-      <p:pic>
-        <p:nvPicPr>
-          <p:cNvPr id="2051" name="Picture 3" descr="C:\Users\damien\Downloads\apple-touch-icon-180x180.png"/>
+          <p:cNvPr id="2055" name="Picture 7" descr="C:\Users\damien\Downloads\apple-touch-icon-180x180.png"/>
           <p:cNvPicPr>
             <a:picLocks noChangeAspect="1" noChangeArrowheads="1"/>
           </p:cNvPicPr>
@@ -4384,8 +4351,8 @@
         </p:blipFill>
         <p:spPr bwMode="auto">
           <a:xfrm>
-            <a:off x="755576" y="3212976"/>
-            <a:ext cx="648072" cy="648072"/>
+            <a:off x="683568" y="1700808"/>
+            <a:ext cx="1224135" cy="525832"/>
           </a:xfrm>
           <a:prstGeom prst="rect">
             <a:avLst/>
@@ -4395,7 +4362,7 @@
       </p:pic>
       <p:pic>
         <p:nvPicPr>
-          <p:cNvPr id="2055" name="Picture 7" descr="C:\Users\damien\Downloads\apple-touch-icon-180x180.png"/>
+          <p:cNvPr id="2056" name="Picture 8" descr="C:\Users\damien\Downloads\npmjs-card.png"/>
           <p:cNvPicPr>
             <a:picLocks noChangeAspect="1" noChangeArrowheads="1"/>
           </p:cNvPicPr>
@@ -4410,8 +4377,8 @@
         </p:blipFill>
         <p:spPr bwMode="auto">
           <a:xfrm>
-            <a:off x="683568" y="1700808"/>
-            <a:ext cx="1224135" cy="525832"/>
+            <a:off x="2771800" y="3248980"/>
+            <a:ext cx="1368152" cy="684076"/>
           </a:xfrm>
           <a:prstGeom prst="rect">
             <a:avLst/>
@@ -4421,40 +4388,7 @@
       </p:pic>
       <p:pic>
         <p:nvPicPr>
-          <p:cNvPr id="53" name="Picture 19"/>
-          <p:cNvPicPr>
-            <a:picLocks noChangeAspect="1" noChangeArrowheads="1"/>
-          </p:cNvPicPr>
-          <p:nvPr/>
-        </p:nvPicPr>
-        <p:blipFill>
-          <a:blip r:embed="rId5" cstate="print"/>
-          <a:srcRect/>
-          <a:stretch>
-            <a:fillRect/>
-          </a:stretch>
-        </p:blipFill>
-        <p:spPr bwMode="auto">
-          <a:xfrm>
-            <a:off x="2699912" y="3158326"/>
-            <a:ext cx="720080" cy="711245"/>
-          </a:xfrm>
-          <a:prstGeom prst="rect">
-            <a:avLst/>
-          </a:prstGeom>
-          <a:noFill/>
-          <a:ln w="9525">
-            <a:noFill/>
-            <a:miter lim="800000"/>
-            <a:headEnd/>
-            <a:tailEnd/>
-          </a:ln>
-          <a:effectLst/>
-        </p:spPr>
-      </p:pic>
-      <p:pic>
-        <p:nvPicPr>
-          <p:cNvPr id="2056" name="Picture 8" descr="C:\Users\damien\Downloads\npmjs-card.png"/>
+          <p:cNvPr id="2057" name="Picture 9" descr="C:\Users\damien\Downloads\images.png"/>
           <p:cNvPicPr>
             <a:picLocks noChangeAspect="1" noChangeArrowheads="1"/>
           </p:cNvPicPr>
@@ -4469,8 +4403,8 @@
         </p:blipFill>
         <p:spPr bwMode="auto">
           <a:xfrm>
-            <a:off x="3347984" y="3248980"/>
-            <a:ext cx="1368152" cy="684076"/>
+            <a:off x="8244408" y="4581128"/>
+            <a:ext cx="557038" cy="557038"/>
           </a:xfrm>
           <a:prstGeom prst="rect">
             <a:avLst/>
@@ -4478,9 +4412,91 @@
           <a:noFill/>
         </p:spPr>
       </p:pic>
+      <p:sp>
+        <p:nvSpPr>
+          <p:cNvPr id="54" name="ZoneTexte 53"/>
+          <p:cNvSpPr txBox="1"/>
+          <p:nvPr/>
+        </p:nvSpPr>
+        <p:spPr>
+          <a:xfrm>
+            <a:off x="8040456" y="5157192"/>
+            <a:ext cx="953659" cy="307777"/>
+          </a:xfrm>
+          <a:prstGeom prst="rect">
+            <a:avLst/>
+          </a:prstGeom>
+          <a:noFill/>
+        </p:spPr>
+        <p:txBody>
+          <a:bodyPr wrap="none" rtlCol="0">
+            <a:spAutoFit/>
+          </a:bodyPr>
+          <a:lstStyle/>
+          <a:p>
+            <a:r>
+              <a:rPr lang="fr-FR" sz="1400" b="1" dirty="0" smtClean="0">
+                <a:solidFill>
+                  <a:schemeClr val="tx2"/>
+                </a:solidFill>
+              </a:rPr>
+              <a:t>DATABASE</a:t>
+            </a:r>
+            <a:endParaRPr lang="fr-FR" sz="1400" b="1" dirty="0">
+              <a:solidFill>
+                <a:schemeClr val="tx2"/>
+              </a:solidFill>
+            </a:endParaRPr>
+          </a:p>
+        </p:txBody>
+      </p:sp>
+      <p:sp>
+        <p:nvSpPr>
+          <p:cNvPr id="55" name="ZoneTexte 54"/>
+          <p:cNvSpPr txBox="1"/>
+          <p:nvPr/>
+        </p:nvSpPr>
+        <p:spPr>
+          <a:xfrm>
+            <a:off x="8244408" y="2226350"/>
+            <a:ext cx="527709" cy="338554"/>
+          </a:xfrm>
+          <a:prstGeom prst="rect">
+            <a:avLst/>
+          </a:prstGeom>
+          <a:noFill/>
+        </p:spPr>
+        <p:txBody>
+          <a:bodyPr wrap="none" rtlCol="0">
+            <a:spAutoFit/>
+          </a:bodyPr>
+          <a:lstStyle/>
+          <a:p>
+            <a:r>
+              <a:rPr lang="fr-FR" sz="1600" b="1" dirty="0" smtClean="0">
+                <a:solidFill>
+                  <a:schemeClr val="tx2">
+                    <a:lumMod val="60000"/>
+                    <a:lumOff val="40000"/>
+                  </a:schemeClr>
+                </a:solidFill>
+              </a:rPr>
+              <a:t>APP</a:t>
+            </a:r>
+            <a:endParaRPr lang="fr-FR" sz="1600" b="1" dirty="0">
+              <a:solidFill>
+                <a:schemeClr val="tx2">
+                  <a:lumMod val="60000"/>
+                  <a:lumOff val="40000"/>
+                </a:schemeClr>
+              </a:solidFill>
+            </a:endParaRPr>
+          </a:p>
+        </p:txBody>
+      </p:sp>
       <p:pic>
         <p:nvPicPr>
-          <p:cNvPr id="2057" name="Picture 9" descr="C:\Users\damien\Downloads\images.png"/>
+          <p:cNvPr id="56" name="Picture 19"/>
           <p:cNvPicPr>
             <a:picLocks noChangeAspect="1" noChangeArrowheads="1"/>
           </p:cNvPicPr>
@@ -4495,116 +4511,8 @@
         </p:blipFill>
         <p:spPr bwMode="auto">
           <a:xfrm>
-            <a:off x="8244408" y="4581128"/>
-            <a:ext cx="557038" cy="557038"/>
-          </a:xfrm>
-          <a:prstGeom prst="rect">
-            <a:avLst/>
-          </a:prstGeom>
-          <a:noFill/>
-        </p:spPr>
-      </p:pic>
-      <p:sp>
-        <p:nvSpPr>
-          <p:cNvPr id="54" name="ZoneTexte 53"/>
-          <p:cNvSpPr txBox="1"/>
-          <p:nvPr/>
-        </p:nvSpPr>
-        <p:spPr>
-          <a:xfrm>
-            <a:off x="8040456" y="5157192"/>
-            <a:ext cx="953659" cy="307777"/>
-          </a:xfrm>
-          <a:prstGeom prst="rect">
-            <a:avLst/>
-          </a:prstGeom>
-          <a:noFill/>
-        </p:spPr>
-        <p:txBody>
-          <a:bodyPr wrap="none" rtlCol="0">
-            <a:spAutoFit/>
-          </a:bodyPr>
-          <a:lstStyle/>
-          <a:p>
-            <a:r>
-              <a:rPr lang="fr-FR" sz="1400" b="1" dirty="0" smtClean="0">
-                <a:solidFill>
-                  <a:schemeClr val="tx2"/>
-                </a:solidFill>
-              </a:rPr>
-              <a:t>DATABASE</a:t>
-            </a:r>
-            <a:endParaRPr lang="fr-FR" sz="1400" b="1" dirty="0">
-              <a:solidFill>
-                <a:schemeClr val="tx2"/>
-              </a:solidFill>
-            </a:endParaRPr>
-          </a:p>
-        </p:txBody>
-      </p:sp>
-      <p:sp>
-        <p:nvSpPr>
-          <p:cNvPr id="55" name="ZoneTexte 54"/>
-          <p:cNvSpPr txBox="1"/>
-          <p:nvPr/>
-        </p:nvSpPr>
-        <p:spPr>
-          <a:xfrm>
-            <a:off x="8244408" y="2226350"/>
-            <a:ext cx="527709" cy="338554"/>
-          </a:xfrm>
-          <a:prstGeom prst="rect">
-            <a:avLst/>
-          </a:prstGeom>
-          <a:noFill/>
-        </p:spPr>
-        <p:txBody>
-          <a:bodyPr wrap="none" rtlCol="0">
-            <a:spAutoFit/>
-          </a:bodyPr>
-          <a:lstStyle/>
-          <a:p>
-            <a:r>
-              <a:rPr lang="fr-FR" sz="1600" b="1" dirty="0" smtClean="0">
-                <a:solidFill>
-                  <a:schemeClr val="tx2">
-                    <a:lumMod val="60000"/>
-                    <a:lumOff val="40000"/>
-                  </a:schemeClr>
-                </a:solidFill>
-              </a:rPr>
-              <a:t>APP</a:t>
-            </a:r>
-            <a:endParaRPr lang="fr-FR" sz="1600" b="1" dirty="0">
-              <a:solidFill>
-                <a:schemeClr val="tx2">
-                  <a:lumMod val="60000"/>
-                  <a:lumOff val="40000"/>
-                </a:schemeClr>
-              </a:solidFill>
-            </a:endParaRPr>
-          </a:p>
-        </p:txBody>
-      </p:sp>
-      <p:pic>
-        <p:nvPicPr>
-          <p:cNvPr id="56" name="Picture 19"/>
-          <p:cNvPicPr>
-            <a:picLocks noChangeAspect="1" noChangeArrowheads="1"/>
-          </p:cNvPicPr>
-          <p:nvPr/>
-        </p:nvPicPr>
-        <p:blipFill>
-          <a:blip r:embed="rId5" cstate="print"/>
-          <a:srcRect/>
-          <a:stretch>
-            <a:fillRect/>
-          </a:stretch>
-        </p:blipFill>
-        <p:spPr bwMode="auto">
-          <a:xfrm>
-            <a:off x="5868144" y="3429000"/>
-            <a:ext cx="720080" cy="711245"/>
+            <a:off x="5940152" y="2933779"/>
+            <a:ext cx="1152128" cy="1137992"/>
           </a:xfrm>
           <a:prstGeom prst="rect">
             <a:avLst/>
@@ -4636,8 +4544,109 @@
         </p:blipFill>
         <p:spPr bwMode="auto">
           <a:xfrm>
-            <a:off x="6613376" y="1941984"/>
+            <a:off x="7236296" y="2924944"/>
             <a:ext cx="550912" cy="550912"/>
+          </a:xfrm>
+          <a:prstGeom prst="rect">
+            <a:avLst/>
+          </a:prstGeom>
+          <a:noFill/>
+        </p:spPr>
+      </p:pic>
+      <p:pic>
+        <p:nvPicPr>
+          <p:cNvPr id="57" name="Picture 5" descr="C:\Users\damien\Downloads\0d184ee3-fd8d-4b94-acf4-b4e686e57375.png"/>
+          <p:cNvPicPr>
+            <a:picLocks noChangeAspect="1" noChangeArrowheads="1"/>
+          </p:cNvPicPr>
+          <p:nvPr/>
+        </p:nvPicPr>
+        <p:blipFill>
+          <a:blip r:embed="rId20" cstate="print"/>
+          <a:srcRect/>
+          <a:stretch>
+            <a:fillRect/>
+          </a:stretch>
+        </p:blipFill>
+        <p:spPr bwMode="auto">
+          <a:xfrm>
+            <a:off x="7236296" y="1844824"/>
+            <a:ext cx="550912" cy="550912"/>
+          </a:xfrm>
+          <a:prstGeom prst="rect">
+            <a:avLst/>
+          </a:prstGeom>
+          <a:noFill/>
+        </p:spPr>
+      </p:pic>
+      <p:sp>
+        <p:nvSpPr>
+          <p:cNvPr id="59" name="Rectangle 58"/>
+          <p:cNvSpPr/>
+          <p:nvPr/>
+        </p:nvSpPr>
+        <p:spPr>
+          <a:xfrm>
+            <a:off x="8028384" y="467961"/>
+            <a:ext cx="954107" cy="584775"/>
+          </a:xfrm>
+          <a:prstGeom prst="rect">
+            <a:avLst/>
+          </a:prstGeom>
+        </p:spPr>
+        <p:txBody>
+          <a:bodyPr wrap="none">
+            <a:spAutoFit/>
+          </a:bodyPr>
+          <a:lstStyle/>
+          <a:p>
+            <a:r>
+              <a:rPr lang="fr-FR" sz="3200" b="1" dirty="0" smtClean="0">
+                <a:solidFill>
+                  <a:schemeClr val="bg1">
+                    <a:lumMod val="75000"/>
+                  </a:schemeClr>
+                </a:solidFill>
+              </a:rPr>
+              <a:t>RUN</a:t>
+            </a:r>
+            <a:endParaRPr lang="fr-FR" sz="3200" b="1" dirty="0">
+              <a:solidFill>
+                <a:schemeClr val="bg1">
+                  <a:lumMod val="75000"/>
+                </a:schemeClr>
+              </a:solidFill>
+            </a:endParaRPr>
+          </a:p>
+        </p:txBody>
+      </p:sp>
+      <p:pic>
+        <p:nvPicPr>
+          <p:cNvPr id="2" name="Picture 2" descr="C:\Users\damien\Downloads\four-browser-icons.png"/>
+          <p:cNvPicPr>
+            <a:picLocks noChangeAspect="1" noChangeArrowheads="1"/>
+          </p:cNvPicPr>
+          <p:nvPr/>
+        </p:nvPicPr>
+        <p:blipFill>
+          <a:blip r:embed="rId21" cstate="print">
+            <a:duotone>
+              <a:schemeClr val="bg2">
+                <a:shade val="45000"/>
+                <a:satMod val="135000"/>
+              </a:schemeClr>
+              <a:prstClr val="white"/>
+            </a:duotone>
+          </a:blip>
+          <a:srcRect/>
+          <a:stretch>
+            <a:fillRect/>
+          </a:stretch>
+        </p:blipFill>
+        <p:spPr bwMode="auto">
+          <a:xfrm>
+            <a:off x="7615733" y="5877272"/>
+            <a:ext cx="1528267" cy="792618"/>
           </a:xfrm>
           <a:prstGeom prst="rect">
             <a:avLst/>

</xml_diff>